<commit_message>
[FIX] slides, add gitignore notebook checkpoints
</commit_message>
<xml_diff>
--- a/slides/python_oop_introduction.pptx
+++ b/slides/python_oop_introduction.pptx
@@ -5,10 +5,10 @@
     <p:sldMasterId id="2147483649" r:id="rId1"/>
   </p:sldMasterIdLst>
   <p:notesMasterIdLst>
-    <p:notesMasterId r:id="rId23"/>
+    <p:notesMasterId r:id="rId25"/>
   </p:notesMasterIdLst>
   <p:handoutMasterIdLst>
-    <p:handoutMasterId r:id="rId24"/>
+    <p:handoutMasterId r:id="rId26"/>
   </p:handoutMasterIdLst>
   <p:sldIdLst>
     <p:sldId id="257" r:id="rId2"/>
@@ -28,10 +28,12 @@
     <p:sldId id="360" r:id="rId16"/>
     <p:sldId id="361" r:id="rId17"/>
     <p:sldId id="364" r:id="rId18"/>
-    <p:sldId id="362" r:id="rId19"/>
-    <p:sldId id="367" r:id="rId20"/>
-    <p:sldId id="368" r:id="rId21"/>
-    <p:sldId id="369" r:id="rId22"/>
+    <p:sldId id="370" r:id="rId19"/>
+    <p:sldId id="371" r:id="rId20"/>
+    <p:sldId id="362" r:id="rId21"/>
+    <p:sldId id="367" r:id="rId22"/>
+    <p:sldId id="368" r:id="rId23"/>
+    <p:sldId id="369" r:id="rId24"/>
   </p:sldIdLst>
   <p:sldSz cx="9144000" cy="6858000" type="screen4x3"/>
   <p:notesSz cx="6858000" cy="9144000"/>
@@ -2180,7 +2182,7 @@
     </p:spTree>
     <p:extLst>
       <p:ext uri="{BB962C8B-B14F-4D97-AF65-F5344CB8AC3E}">
-        <p14:creationId xmlns:p14="http://schemas.microsoft.com/office/powerpoint/2010/main" val="3845483854"/>
+        <p14:creationId xmlns:p14="http://schemas.microsoft.com/office/powerpoint/2010/main" val="2754316981"/>
       </p:ext>
     </p:extLst>
   </p:cSld>
@@ -2287,7 +2289,7 @@
     </p:spTree>
     <p:extLst>
       <p:ext uri="{BB962C8B-B14F-4D97-AF65-F5344CB8AC3E}">
-        <p14:creationId xmlns:p14="http://schemas.microsoft.com/office/powerpoint/2010/main" val="3300602968"/>
+        <p14:creationId xmlns:p14="http://schemas.microsoft.com/office/powerpoint/2010/main" val="1876177504"/>
       </p:ext>
     </p:extLst>
   </p:cSld>
@@ -2501,7 +2503,7 @@
     </p:spTree>
     <p:extLst>
       <p:ext uri="{BB962C8B-B14F-4D97-AF65-F5344CB8AC3E}">
-        <p14:creationId xmlns:p14="http://schemas.microsoft.com/office/powerpoint/2010/main" val="1401498857"/>
+        <p14:creationId xmlns:p14="http://schemas.microsoft.com/office/powerpoint/2010/main" val="3845483854"/>
       </p:ext>
     </p:extLst>
   </p:cSld>
@@ -2555,6 +2557,220 @@
               <a:rPr lang="de-DE" altLang="en-DE"/>
               <a:pPr/>
               <a:t>21</a:t>
+            </a:fld>
+            <a:endParaRPr lang="de-DE" altLang="en-DE"/>
+          </a:p>
+        </p:txBody>
+      </p:sp>
+      <p:sp>
+        <p:nvSpPr>
+          <p:cNvPr id="76802" name="Rectangle 2">
+            <a:extLst>
+              <a:ext uri="{FF2B5EF4-FFF2-40B4-BE49-F238E27FC236}">
+                <a16:creationId xmlns:a16="http://schemas.microsoft.com/office/drawing/2014/main" id="{5E90339C-E52D-484F-8976-61C6E64A555B}"/>
+              </a:ext>
+            </a:extLst>
+          </p:cNvPr>
+          <p:cNvSpPr>
+            <a:spLocks noGrp="1" noRot="1" noChangeAspect="1" noChangeArrowheads="1" noTextEdit="1"/>
+          </p:cNvSpPr>
+          <p:nvPr>
+            <p:ph type="sldImg"/>
+          </p:nvPr>
+        </p:nvSpPr>
+        <p:spPr>
+          <a:ln/>
+        </p:spPr>
+      </p:sp>
+      <p:sp>
+        <p:nvSpPr>
+          <p:cNvPr id="76803" name="Rectangle 3">
+            <a:extLst>
+              <a:ext uri="{FF2B5EF4-FFF2-40B4-BE49-F238E27FC236}">
+                <a16:creationId xmlns:a16="http://schemas.microsoft.com/office/drawing/2014/main" id="{7C580580-A363-AD41-9E48-DB3D626BBC86}"/>
+              </a:ext>
+            </a:extLst>
+          </p:cNvPr>
+          <p:cNvSpPr>
+            <a:spLocks noGrp="1" noChangeArrowheads="1"/>
+          </p:cNvSpPr>
+          <p:nvPr>
+            <p:ph type="body" idx="1"/>
+          </p:nvPr>
+        </p:nvSpPr>
+        <p:spPr/>
+        <p:txBody>
+          <a:bodyPr/>
+          <a:lstStyle/>
+          <a:p>
+            <a:endParaRPr lang="en-GB" altLang="en-DE"/>
+          </a:p>
+        </p:txBody>
+      </p:sp>
+    </p:spTree>
+    <p:extLst>
+      <p:ext uri="{BB962C8B-B14F-4D97-AF65-F5344CB8AC3E}">
+        <p14:creationId xmlns:p14="http://schemas.microsoft.com/office/powerpoint/2010/main" val="3300602968"/>
+      </p:ext>
+    </p:extLst>
+  </p:cSld>
+  <p:clrMapOvr>
+    <a:masterClrMapping/>
+  </p:clrMapOvr>
+</p:notes>
+</file>
+
+<file path=ppt/notesSlides/notesSlide22.xml><?xml version="1.0" encoding="utf-8"?>
+<p:notes xmlns:a="http://schemas.openxmlformats.org/drawingml/2006/main" xmlns:r="http://schemas.openxmlformats.org/officeDocument/2006/relationships" xmlns:p="http://schemas.openxmlformats.org/presentationml/2006/main">
+  <p:cSld>
+    <p:spTree>
+      <p:nvGrpSpPr>
+        <p:cNvPr id="1" name=""/>
+        <p:cNvGrpSpPr/>
+        <p:nvPr/>
+      </p:nvGrpSpPr>
+      <p:grpSpPr>
+        <a:xfrm>
+          <a:off x="0" y="0"/>
+          <a:ext cx="0" cy="0"/>
+          <a:chOff x="0" y="0"/>
+          <a:chExt cx="0" cy="0"/>
+        </a:xfrm>
+      </p:grpSpPr>
+      <p:sp>
+        <p:nvSpPr>
+          <p:cNvPr id="7" name="Rectangle 7">
+            <a:extLst>
+              <a:ext uri="{FF2B5EF4-FFF2-40B4-BE49-F238E27FC236}">
+                <a16:creationId xmlns:a16="http://schemas.microsoft.com/office/drawing/2014/main" id="{1186215F-B194-9D4C-8715-1DBDABD2D273}"/>
+              </a:ext>
+            </a:extLst>
+          </p:cNvPr>
+          <p:cNvSpPr>
+            <a:spLocks noGrp="1" noChangeArrowheads="1"/>
+          </p:cNvSpPr>
+          <p:nvPr>
+            <p:ph type="sldNum" sz="quarter" idx="5"/>
+          </p:nvPr>
+        </p:nvSpPr>
+        <p:spPr>
+          <a:ln/>
+        </p:spPr>
+        <p:txBody>
+          <a:bodyPr/>
+          <a:lstStyle/>
+          <a:p>
+            <a:fld id="{4F1300AB-B724-4D44-8C71-343ACB7ED486}" type="slidenum">
+              <a:rPr lang="de-DE" altLang="en-DE"/>
+              <a:pPr/>
+              <a:t>22</a:t>
+            </a:fld>
+            <a:endParaRPr lang="de-DE" altLang="en-DE"/>
+          </a:p>
+        </p:txBody>
+      </p:sp>
+      <p:sp>
+        <p:nvSpPr>
+          <p:cNvPr id="76802" name="Rectangle 2">
+            <a:extLst>
+              <a:ext uri="{FF2B5EF4-FFF2-40B4-BE49-F238E27FC236}">
+                <a16:creationId xmlns:a16="http://schemas.microsoft.com/office/drawing/2014/main" id="{5E90339C-E52D-484F-8976-61C6E64A555B}"/>
+              </a:ext>
+            </a:extLst>
+          </p:cNvPr>
+          <p:cNvSpPr>
+            <a:spLocks noGrp="1" noRot="1" noChangeAspect="1" noChangeArrowheads="1" noTextEdit="1"/>
+          </p:cNvSpPr>
+          <p:nvPr>
+            <p:ph type="sldImg"/>
+          </p:nvPr>
+        </p:nvSpPr>
+        <p:spPr>
+          <a:ln/>
+        </p:spPr>
+      </p:sp>
+      <p:sp>
+        <p:nvSpPr>
+          <p:cNvPr id="76803" name="Rectangle 3">
+            <a:extLst>
+              <a:ext uri="{FF2B5EF4-FFF2-40B4-BE49-F238E27FC236}">
+                <a16:creationId xmlns:a16="http://schemas.microsoft.com/office/drawing/2014/main" id="{7C580580-A363-AD41-9E48-DB3D626BBC86}"/>
+              </a:ext>
+            </a:extLst>
+          </p:cNvPr>
+          <p:cNvSpPr>
+            <a:spLocks noGrp="1" noChangeArrowheads="1"/>
+          </p:cNvSpPr>
+          <p:nvPr>
+            <p:ph type="body" idx="1"/>
+          </p:nvPr>
+        </p:nvSpPr>
+        <p:spPr/>
+        <p:txBody>
+          <a:bodyPr/>
+          <a:lstStyle/>
+          <a:p>
+            <a:endParaRPr lang="en-GB" altLang="en-DE"/>
+          </a:p>
+        </p:txBody>
+      </p:sp>
+    </p:spTree>
+    <p:extLst>
+      <p:ext uri="{BB962C8B-B14F-4D97-AF65-F5344CB8AC3E}">
+        <p14:creationId xmlns:p14="http://schemas.microsoft.com/office/powerpoint/2010/main" val="1401498857"/>
+      </p:ext>
+    </p:extLst>
+  </p:cSld>
+  <p:clrMapOvr>
+    <a:masterClrMapping/>
+  </p:clrMapOvr>
+</p:notes>
+</file>
+
+<file path=ppt/notesSlides/notesSlide23.xml><?xml version="1.0" encoding="utf-8"?>
+<p:notes xmlns:a="http://schemas.openxmlformats.org/drawingml/2006/main" xmlns:r="http://schemas.openxmlformats.org/officeDocument/2006/relationships" xmlns:p="http://schemas.openxmlformats.org/presentationml/2006/main">
+  <p:cSld>
+    <p:spTree>
+      <p:nvGrpSpPr>
+        <p:cNvPr id="1" name=""/>
+        <p:cNvGrpSpPr/>
+        <p:nvPr/>
+      </p:nvGrpSpPr>
+      <p:grpSpPr>
+        <a:xfrm>
+          <a:off x="0" y="0"/>
+          <a:ext cx="0" cy="0"/>
+          <a:chOff x="0" y="0"/>
+          <a:chExt cx="0" cy="0"/>
+        </a:xfrm>
+      </p:grpSpPr>
+      <p:sp>
+        <p:nvSpPr>
+          <p:cNvPr id="7" name="Rectangle 7">
+            <a:extLst>
+              <a:ext uri="{FF2B5EF4-FFF2-40B4-BE49-F238E27FC236}">
+                <a16:creationId xmlns:a16="http://schemas.microsoft.com/office/drawing/2014/main" id="{1186215F-B194-9D4C-8715-1DBDABD2D273}"/>
+              </a:ext>
+            </a:extLst>
+          </p:cNvPr>
+          <p:cNvSpPr>
+            <a:spLocks noGrp="1" noChangeArrowheads="1"/>
+          </p:cNvSpPr>
+          <p:nvPr>
+            <p:ph type="sldNum" sz="quarter" idx="5"/>
+          </p:nvPr>
+        </p:nvSpPr>
+        <p:spPr>
+          <a:ln/>
+        </p:spPr>
+        <p:txBody>
+          <a:bodyPr/>
+          <a:lstStyle/>
+          <a:p>
+            <a:fld id="{4F1300AB-B724-4D44-8C71-343ACB7ED486}" type="slidenum">
+              <a:rPr lang="de-DE" altLang="en-DE"/>
+              <a:pPr/>
+              <a:t>23</a:t>
             </a:fld>
             <a:endParaRPr lang="de-DE" altLang="en-DE"/>
           </a:p>
@@ -3453,7 +3669,7 @@
             <a:fld id="{9A65F905-DD3F-5F46-B363-3A25213D35DC}" type="datetime1">
               <a:rPr lang="en-GB" altLang="en-DE"/>
               <a:pPr/>
-              <a:t>20/10/2020</a:t>
+              <a:t>25/10/2020</a:t>
             </a:fld>
             <a:r>
               <a:rPr lang="de-DE" altLang="en-DE"/>
@@ -3801,7 +4017,7 @@
             <a:fld id="{2094617C-4143-4541-951E-A412BFD259BA}" type="datetime1">
               <a:rPr lang="en-GB" altLang="en-DE"/>
               <a:pPr/>
-              <a:t>20/10/2020</a:t>
+              <a:t>25/10/2020</a:t>
             </a:fld>
             <a:r>
               <a:rPr lang="en-GB" altLang="en-DE" dirty="0"/>
@@ -3986,7 +4202,7 @@
             <a:fld id="{2094617C-4143-4541-951E-A412BFD259BA}" type="datetime1">
               <a:rPr lang="en-GB" altLang="en-DE"/>
               <a:pPr/>
-              <a:t>20/10/2020</a:t>
+              <a:t>25/10/2020</a:t>
             </a:fld>
             <a:r>
               <a:rPr lang="en-GB" altLang="en-DE" dirty="0"/>
@@ -4161,7 +4377,7 @@
             <a:fld id="{2094617C-4143-4541-951E-A412BFD259BA}" type="datetime1">
               <a:rPr lang="en-GB" altLang="en-DE" smtClean="0"/>
               <a:pPr/>
-              <a:t>20/10/2020</a:t>
+              <a:t>25/10/2020</a:t>
             </a:fld>
             <a:r>
               <a:rPr lang="en-GB" altLang="en-DE" dirty="0"/>
@@ -4358,7 +4574,7 @@
             <a:fld id="{2094617C-4143-4541-951E-A412BFD259BA}" type="datetime1">
               <a:rPr lang="en-GB" altLang="en-DE" smtClean="0"/>
               <a:pPr/>
-              <a:t>20/10/2020</a:t>
+              <a:t>25/10/2020</a:t>
             </a:fld>
             <a:r>
               <a:rPr lang="en-GB" altLang="en-DE" dirty="0"/>
@@ -4601,7 +4817,7 @@
             <a:fld id="{2094617C-4143-4541-951E-A412BFD259BA}" type="datetime1">
               <a:rPr lang="en-GB" altLang="en-DE" smtClean="0"/>
               <a:pPr/>
-              <a:t>20/10/2020</a:t>
+              <a:t>25/10/2020</a:t>
             </a:fld>
             <a:r>
               <a:rPr lang="en-GB" altLang="en-DE" dirty="0"/>
@@ -4991,7 +5207,7 @@
             <a:fld id="{2094617C-4143-4541-951E-A412BFD259BA}" type="datetime1">
               <a:rPr lang="en-GB" altLang="en-DE" smtClean="0"/>
               <a:pPr/>
-              <a:t>20/10/2020</a:t>
+              <a:t>25/10/2020</a:t>
             </a:fld>
             <a:r>
               <a:rPr lang="en-GB" altLang="en-DE" dirty="0"/>
@@ -5108,7 +5324,7 @@
             <a:fld id="{2094617C-4143-4541-951E-A412BFD259BA}" type="datetime1">
               <a:rPr lang="en-GB" altLang="en-DE" smtClean="0"/>
               <a:pPr/>
-              <a:t>20/10/2020</a:t>
+              <a:t>25/10/2020</a:t>
             </a:fld>
             <a:r>
               <a:rPr lang="en-GB" altLang="en-DE" dirty="0"/>
@@ -5196,7 +5412,7 @@
             <a:fld id="{2094617C-4143-4541-951E-A412BFD259BA}" type="datetime1">
               <a:rPr lang="en-GB" altLang="en-DE" smtClean="0"/>
               <a:pPr/>
-              <a:t>20/10/2020</a:t>
+              <a:t>25/10/2020</a:t>
             </a:fld>
             <a:r>
               <a:rPr lang="en-GB" altLang="en-DE" dirty="0"/>
@@ -5484,7 +5700,7 @@
             <a:fld id="{2094617C-4143-4541-951E-A412BFD259BA}" type="datetime1">
               <a:rPr lang="en-GB" altLang="en-DE"/>
               <a:pPr/>
-              <a:t>20/10/2020</a:t>
+              <a:t>25/10/2020</a:t>
             </a:fld>
             <a:r>
               <a:rPr lang="en-GB" altLang="en-DE" dirty="0"/>
@@ -5752,7 +5968,7 @@
             <a:fld id="{2094617C-4143-4541-951E-A412BFD259BA}" type="datetime1">
               <a:rPr lang="en-GB" altLang="en-DE"/>
               <a:pPr/>
-              <a:t>20/10/2020</a:t>
+              <a:t>25/10/2020</a:t>
             </a:fld>
             <a:r>
               <a:rPr lang="en-GB" altLang="en-DE" dirty="0"/>
@@ -6086,7 +6302,7 @@
             <a:fld id="{2094617C-4143-4541-951E-A412BFD259BA}" type="datetime1">
               <a:rPr lang="en-GB" altLang="en-DE"/>
               <a:pPr/>
-              <a:t>20/10/2020</a:t>
+              <a:t>25/10/2020</a:t>
             </a:fld>
             <a:r>
               <a:rPr lang="en-GB" altLang="en-DE" dirty="0"/>
@@ -8419,7 +8635,7 @@
             </a:r>
             <a:r>
               <a:rPr lang="en-GB" altLang="en-DE" dirty="0"/>
-              <a:t>08/04/2020 </a:t>
+              <a:t>26/10/2020 </a:t>
             </a:r>
             <a:r>
               <a:rPr lang="de-DE" altLang="en-DE" dirty="0"/>
@@ -8489,17 +8705,17 @@
                 <a:latin typeface="Berlin Sans FB" panose="020F0502020204030204" pitchFamily="34" charset="0"/>
                 <a:cs typeface="Berlin Sans FB" panose="020F0502020204030204" pitchFamily="34" charset="0"/>
               </a:rPr>
-              <a:t>Static Methods?</a:t>
+              <a:t>Methods?</a:t>
             </a:r>
           </a:p>
         </p:txBody>
       </p:sp>
       <p:pic>
         <p:nvPicPr>
-          <p:cNvPr id="4" name="Picture 3" descr="Graphical user interface, text&#10;&#10;Description automatically generated">
-            <a:extLst>
-              <a:ext uri="{FF2B5EF4-FFF2-40B4-BE49-F238E27FC236}">
-                <a16:creationId xmlns:a16="http://schemas.microsoft.com/office/drawing/2014/main" id="{11EB7C42-9329-4836-BD54-E06816B80E3C}"/>
+          <p:cNvPr id="6" name="Picture 5" descr="Graphical user interface, text, application&#10;&#10;Description automatically generated">
+            <a:extLst>
+              <a:ext uri="{FF2B5EF4-FFF2-40B4-BE49-F238E27FC236}">
+                <a16:creationId xmlns:a16="http://schemas.microsoft.com/office/drawing/2014/main" id="{5A5357BE-7D34-9046-A7F5-E22A648B138A}"/>
               </a:ext>
             </a:extLst>
           </p:cNvPr>
@@ -8516,8 +8732,8 @@
         </p:blipFill>
         <p:spPr>
           <a:xfrm>
-            <a:off x="2233286" y="2768105"/>
-            <a:ext cx="4677428" cy="2743583"/>
+            <a:off x="1986979" y="2762506"/>
+            <a:ext cx="5170042" cy="3209537"/>
           </a:xfrm>
           <a:prstGeom prst="rect">
             <a:avLst/>
@@ -8641,7 +8857,7 @@
                 <a:latin typeface="Berlin Sans FB" panose="020F0502020204030204" pitchFamily="34" charset="0"/>
                 <a:cs typeface="Berlin Sans FB" panose="020F0502020204030204" pitchFamily="34" charset="0"/>
               </a:rPr>
-              <a:t>What is</a:t>
+              <a:t>What are</a:t>
             </a:r>
           </a:p>
           <a:p>
@@ -8656,17 +8872,17 @@
                 <a:latin typeface="Berlin Sans FB" panose="020F0502020204030204" pitchFamily="34" charset="0"/>
                 <a:cs typeface="Berlin Sans FB" panose="020F0502020204030204" pitchFamily="34" charset="0"/>
               </a:rPr>
-              <a:t>Inheritance?</a:t>
+              <a:t>Static Methods?</a:t>
             </a:r>
           </a:p>
         </p:txBody>
       </p:sp>
       <p:pic>
         <p:nvPicPr>
-          <p:cNvPr id="4" name="Picture 3" descr="A picture containing text&#10;&#10;Description automatically generated">
-            <a:extLst>
-              <a:ext uri="{FF2B5EF4-FFF2-40B4-BE49-F238E27FC236}">
-                <a16:creationId xmlns:a16="http://schemas.microsoft.com/office/drawing/2014/main" id="{F3A8B835-887A-4D2C-A1FB-BF7C9607E668}"/>
+          <p:cNvPr id="3" name="Picture 2" descr="A picture containing text&#10;&#10;Description automatically generated">
+            <a:extLst>
+              <a:ext uri="{FF2B5EF4-FFF2-40B4-BE49-F238E27FC236}">
+                <a16:creationId xmlns:a16="http://schemas.microsoft.com/office/drawing/2014/main" id="{2D64F731-C176-6C48-A8E8-FA43C29CA7DB}"/>
               </a:ext>
             </a:extLst>
           </p:cNvPr>
@@ -8683,8 +8899,8 @@
         </p:blipFill>
         <p:spPr>
           <a:xfrm>
-            <a:off x="2199944" y="2798659"/>
-            <a:ext cx="4744112" cy="2791215"/>
+            <a:off x="2383605" y="2700179"/>
+            <a:ext cx="4090470" cy="3323981"/>
           </a:xfrm>
           <a:prstGeom prst="rect">
             <a:avLst/>
@@ -8694,7 +8910,7 @@
     </p:spTree>
     <p:extLst>
       <p:ext uri="{BB962C8B-B14F-4D97-AF65-F5344CB8AC3E}">
-        <p14:creationId xmlns:p14="http://schemas.microsoft.com/office/powerpoint/2010/main" val="2571570597"/>
+        <p14:creationId xmlns:p14="http://schemas.microsoft.com/office/powerpoint/2010/main" val="3620668016"/>
       </p:ext>
     </p:extLst>
   </p:cSld>
@@ -8785,7 +9001,7 @@
         <p:spPr>
           <a:xfrm>
             <a:off x="719138" y="982621"/>
-            <a:ext cx="8212989" cy="1015663"/>
+            <a:ext cx="8212989" cy="1508105"/>
           </a:xfrm>
           <a:prstGeom prst="rect">
             <a:avLst/>
@@ -8797,6 +9013,20 @@
             <a:spAutoFit/>
           </a:bodyPr>
           <a:lstStyle/>
+          <a:p>
+            <a:r>
+              <a:rPr lang="en-GB" sz="3200" dirty="0">
+                <a:solidFill>
+                  <a:schemeClr val="bg1">
+                    <a:lumMod val="75000"/>
+                  </a:schemeClr>
+                </a:solidFill>
+                <a:latin typeface="Berlin Sans FB" panose="020F0502020204030204" pitchFamily="34" charset="0"/>
+                <a:cs typeface="Berlin Sans FB" panose="020F0502020204030204" pitchFamily="34" charset="0"/>
+              </a:rPr>
+              <a:t>What are</a:t>
+            </a:r>
+          </a:p>
           <a:p>
             <a:r>
               <a:rPr lang="en-GB" sz="6000" dirty="0">
@@ -8809,15 +9039,45 @@
                 <a:latin typeface="Berlin Sans FB" panose="020F0502020204030204" pitchFamily="34" charset="0"/>
                 <a:cs typeface="Berlin Sans FB" panose="020F0502020204030204" pitchFamily="34" charset="0"/>
               </a:rPr>
-              <a:t>Questions?</a:t>
-            </a:r>
-          </a:p>
-        </p:txBody>
-      </p:sp>
+              <a:t>Class Methods?</a:t>
+            </a:r>
+          </a:p>
+        </p:txBody>
+      </p:sp>
+      <p:pic>
+        <p:nvPicPr>
+          <p:cNvPr id="3" name="Picture 2" descr="A picture containing text&#10;&#10;Description automatically generated">
+            <a:extLst>
+              <a:ext uri="{FF2B5EF4-FFF2-40B4-BE49-F238E27FC236}">
+                <a16:creationId xmlns:a16="http://schemas.microsoft.com/office/drawing/2014/main" id="{127697A6-BA28-7B4A-B05A-13190282005A}"/>
+              </a:ext>
+            </a:extLst>
+          </p:cNvPr>
+          <p:cNvPicPr>
+            <a:picLocks noChangeAspect="1"/>
+          </p:cNvPicPr>
+          <p:nvPr/>
+        </p:nvPicPr>
+        <p:blipFill>
+          <a:blip r:embed="rId3"/>
+          <a:stretch>
+            <a:fillRect/>
+          </a:stretch>
+        </p:blipFill>
+        <p:spPr>
+          <a:xfrm>
+            <a:off x="2157573" y="2898064"/>
+            <a:ext cx="5178603" cy="2938421"/>
+          </a:xfrm>
+          <a:prstGeom prst="rect">
+            <a:avLst/>
+          </a:prstGeom>
+        </p:spPr>
+      </p:pic>
     </p:spTree>
     <p:extLst>
       <p:ext uri="{BB962C8B-B14F-4D97-AF65-F5344CB8AC3E}">
-        <p14:creationId xmlns:p14="http://schemas.microsoft.com/office/powerpoint/2010/main" val="2390257302"/>
+        <p14:creationId xmlns:p14="http://schemas.microsoft.com/office/powerpoint/2010/main" val="3964264875"/>
       </p:ext>
     </p:extLst>
   </p:cSld>
@@ -9250,7 +9510,7 @@
         <p:spPr>
           <a:xfrm>
             <a:off x="719138" y="982621"/>
-            <a:ext cx="8212989" cy="1015663"/>
+            <a:ext cx="8212989" cy="1508105"/>
           </a:xfrm>
           <a:prstGeom prst="rect">
             <a:avLst/>
@@ -9262,6 +9522,20 @@
             <a:spAutoFit/>
           </a:bodyPr>
           <a:lstStyle/>
+          <a:p>
+            <a:r>
+              <a:rPr lang="en-GB" sz="3200" dirty="0">
+                <a:solidFill>
+                  <a:schemeClr val="bg1">
+                    <a:lumMod val="75000"/>
+                  </a:schemeClr>
+                </a:solidFill>
+                <a:latin typeface="Berlin Sans FB" panose="020F0502020204030204" pitchFamily="34" charset="0"/>
+                <a:cs typeface="Berlin Sans FB" panose="020F0502020204030204" pitchFamily="34" charset="0"/>
+              </a:rPr>
+              <a:t>What is</a:t>
+            </a:r>
+          </a:p>
           <a:p>
             <a:r>
               <a:rPr lang="en-GB" sz="6000" dirty="0">
@@ -9274,71 +9548,45 @@
                 <a:latin typeface="Berlin Sans FB" panose="020F0502020204030204" pitchFamily="34" charset="0"/>
                 <a:cs typeface="Berlin Sans FB" panose="020F0502020204030204" pitchFamily="34" charset="0"/>
               </a:rPr>
-              <a:t>Project:</a:t>
-            </a:r>
-          </a:p>
-        </p:txBody>
-      </p:sp>
-      <p:sp>
-        <p:nvSpPr>
-          <p:cNvPr id="6" name="TextBox 5">
-            <a:extLst>
-              <a:ext uri="{FF2B5EF4-FFF2-40B4-BE49-F238E27FC236}">
-                <a16:creationId xmlns:a16="http://schemas.microsoft.com/office/drawing/2014/main" id="{9A572F02-FCCA-4B62-B0A0-9A5290204C2B}"/>
-              </a:ext>
-            </a:extLst>
-          </p:cNvPr>
-          <p:cNvSpPr txBox="1"/>
+              <a:t>Inheritance?</a:t>
+            </a:r>
+          </a:p>
+        </p:txBody>
+      </p:sp>
+      <p:pic>
+        <p:nvPicPr>
+          <p:cNvPr id="4" name="Picture 3" descr="A picture containing text&#10;&#10;Description automatically generated">
+            <a:extLst>
+              <a:ext uri="{FF2B5EF4-FFF2-40B4-BE49-F238E27FC236}">
+                <a16:creationId xmlns:a16="http://schemas.microsoft.com/office/drawing/2014/main" id="{F3A8B835-887A-4D2C-A1FB-BF7C9607E668}"/>
+              </a:ext>
+            </a:extLst>
+          </p:cNvPr>
+          <p:cNvPicPr>
+            <a:picLocks noChangeAspect="1"/>
+          </p:cNvPicPr>
           <p:nvPr/>
-        </p:nvSpPr>
+        </p:nvPicPr>
+        <p:blipFill>
+          <a:blip r:embed="rId3"/>
+          <a:stretch>
+            <a:fillRect/>
+          </a:stretch>
+        </p:blipFill>
         <p:spPr>
           <a:xfrm>
-            <a:off x="838540" y="1998284"/>
-            <a:ext cx="7466920" cy="1077218"/>
+            <a:off x="2199944" y="2798659"/>
+            <a:ext cx="4744112" cy="2791215"/>
           </a:xfrm>
           <a:prstGeom prst="rect">
             <a:avLst/>
           </a:prstGeom>
-          <a:noFill/>
-        </p:spPr>
-        <p:txBody>
-          <a:bodyPr wrap="square" rtlCol="0">
-            <a:spAutoFit/>
-          </a:bodyPr>
-          <a:lstStyle/>
-          <a:p>
-            <a:pPr marL="285750" indent="-285750">
-              <a:buFont typeface="Arial" panose="020B0604020202020204" pitchFamily="34" charset="0"/>
-              <a:buChar char="•"/>
-            </a:pPr>
-            <a:r>
-              <a:rPr lang="en-US" sz="3200" dirty="0">
-                <a:latin typeface="Berlin Sans FB" panose="020E0602020502020306" pitchFamily="34" charset="0"/>
-              </a:rPr>
-              <a:t>Build a decoy database generator</a:t>
-            </a:r>
-          </a:p>
-          <a:p>
-            <a:pPr marL="285750" indent="-285750">
-              <a:buFont typeface="Arial" panose="020B0604020202020204" pitchFamily="34" charset="0"/>
-              <a:buChar char="•"/>
-            </a:pPr>
-            <a:endParaRPr lang="en-US" sz="3200" dirty="0">
-              <a:solidFill>
-                <a:schemeClr val="tx1">
-                  <a:lumMod val="60000"/>
-                  <a:lumOff val="40000"/>
-                </a:schemeClr>
-              </a:solidFill>
-              <a:latin typeface="Berlin Sans FB" panose="020E0602020502020306" pitchFamily="34" charset="0"/>
-            </a:endParaRPr>
-          </a:p>
-        </p:txBody>
-      </p:sp>
+        </p:spPr>
+      </p:pic>
     </p:spTree>
     <p:extLst>
       <p:ext uri="{BB962C8B-B14F-4D97-AF65-F5344CB8AC3E}">
-        <p14:creationId xmlns:p14="http://schemas.microsoft.com/office/powerpoint/2010/main" val="1210839149"/>
+        <p14:creationId xmlns:p14="http://schemas.microsoft.com/office/powerpoint/2010/main" val="2571570597"/>
       </p:ext>
     </p:extLst>
   </p:cSld>
@@ -9390,6 +9638,308 @@
               <a:rPr lang="de-DE" altLang="en-DE"/>
               <a:pPr/>
               <a:t>21</a:t>
+            </a:fld>
+            <a:r>
+              <a:rPr lang="de-DE" altLang="en-DE" dirty="0"/>
+              <a:t> | Samuel Wein	© </a:t>
+            </a:r>
+            <a:r>
+              <a:rPr lang="en-GB" altLang="en-DE" dirty="0"/>
+              <a:t>26/10/2020 </a:t>
+            </a:r>
+            <a:r>
+              <a:rPr lang="de-DE" altLang="en-DE" dirty="0"/>
+              <a:t>University </a:t>
+            </a:r>
+            <a:r>
+              <a:rPr lang="de-DE" altLang="en-DE" dirty="0" err="1"/>
+              <a:t>of</a:t>
+            </a:r>
+            <a:r>
+              <a:rPr lang="de-DE" altLang="en-DE" dirty="0"/>
+              <a:t> Tübingen</a:t>
+            </a:r>
+          </a:p>
+        </p:txBody>
+      </p:sp>
+      <p:sp>
+        <p:nvSpPr>
+          <p:cNvPr id="7" name="TextBox 6">
+            <a:extLst>
+              <a:ext uri="{FF2B5EF4-FFF2-40B4-BE49-F238E27FC236}">
+                <a16:creationId xmlns:a16="http://schemas.microsoft.com/office/drawing/2014/main" id="{CE02424B-1B44-964D-A1D8-6EDD247DFD22}"/>
+              </a:ext>
+            </a:extLst>
+          </p:cNvPr>
+          <p:cNvSpPr txBox="1"/>
+          <p:nvPr/>
+        </p:nvSpPr>
+        <p:spPr>
+          <a:xfrm>
+            <a:off x="719138" y="982621"/>
+            <a:ext cx="8212989" cy="1015663"/>
+          </a:xfrm>
+          <a:prstGeom prst="rect">
+            <a:avLst/>
+          </a:prstGeom>
+          <a:noFill/>
+        </p:spPr>
+        <p:txBody>
+          <a:bodyPr wrap="square" rtlCol="0">
+            <a:spAutoFit/>
+          </a:bodyPr>
+          <a:lstStyle/>
+          <a:p>
+            <a:r>
+              <a:rPr lang="en-GB" sz="6000" dirty="0">
+                <a:solidFill>
+                  <a:schemeClr val="tx1">
+                    <a:lumMod val="50000"/>
+                    <a:lumOff val="50000"/>
+                  </a:schemeClr>
+                </a:solidFill>
+                <a:latin typeface="Berlin Sans FB" panose="020F0502020204030204" pitchFamily="34" charset="0"/>
+                <a:cs typeface="Berlin Sans FB" panose="020F0502020204030204" pitchFamily="34" charset="0"/>
+              </a:rPr>
+              <a:t>Questions?</a:t>
+            </a:r>
+          </a:p>
+        </p:txBody>
+      </p:sp>
+    </p:spTree>
+    <p:extLst>
+      <p:ext uri="{BB962C8B-B14F-4D97-AF65-F5344CB8AC3E}">
+        <p14:creationId xmlns:p14="http://schemas.microsoft.com/office/powerpoint/2010/main" val="2390257302"/>
+      </p:ext>
+    </p:extLst>
+  </p:cSld>
+  <p:clrMapOvr>
+    <a:masterClrMapping/>
+  </p:clrMapOvr>
+</p:sld>
+</file>
+
+<file path=ppt/slides/slide22.xml><?xml version="1.0" encoding="utf-8"?>
+<p:sld xmlns:a="http://schemas.openxmlformats.org/drawingml/2006/main" xmlns:r="http://schemas.openxmlformats.org/officeDocument/2006/relationships" xmlns:p="http://schemas.openxmlformats.org/presentationml/2006/main">
+  <p:cSld>
+    <p:spTree>
+      <p:nvGrpSpPr>
+        <p:cNvPr id="1" name=""/>
+        <p:cNvGrpSpPr/>
+        <p:nvPr/>
+      </p:nvGrpSpPr>
+      <p:grpSpPr>
+        <a:xfrm>
+          <a:off x="0" y="0"/>
+          <a:ext cx="0" cy="0"/>
+          <a:chOff x="0" y="0"/>
+          <a:chExt cx="0" cy="0"/>
+        </a:xfrm>
+      </p:grpSpPr>
+      <p:sp>
+        <p:nvSpPr>
+          <p:cNvPr id="5" name="Slide Number Placeholder 3">
+            <a:extLst>
+              <a:ext uri="{FF2B5EF4-FFF2-40B4-BE49-F238E27FC236}">
+                <a16:creationId xmlns:a16="http://schemas.microsoft.com/office/drawing/2014/main" id="{88A19A4B-57C6-5140-A43C-B8D8318275FC}"/>
+              </a:ext>
+            </a:extLst>
+          </p:cNvPr>
+          <p:cNvSpPr>
+            <a:spLocks noGrp="1"/>
+          </p:cNvSpPr>
+          <p:nvPr>
+            <p:ph type="sldNum" sz="quarter" idx="10"/>
+          </p:nvPr>
+        </p:nvSpPr>
+        <p:spPr/>
+        <p:txBody>
+          <a:bodyPr/>
+          <a:lstStyle/>
+          <a:p>
+            <a:fld id="{F8D72127-71F4-024A-9532-225DC2F8CFB8}" type="slidenum">
+              <a:rPr lang="de-DE" altLang="en-DE"/>
+              <a:pPr/>
+              <a:t>22</a:t>
+            </a:fld>
+            <a:r>
+              <a:rPr lang="de-DE" altLang="en-DE" dirty="0"/>
+              <a:t> | Samuel Wein	© </a:t>
+            </a:r>
+            <a:r>
+              <a:rPr lang="en-GB" altLang="en-DE" dirty="0"/>
+              <a:t>26/10/2020 </a:t>
+            </a:r>
+            <a:r>
+              <a:rPr lang="de-DE" altLang="en-DE" dirty="0"/>
+              <a:t>University </a:t>
+            </a:r>
+            <a:r>
+              <a:rPr lang="de-DE" altLang="en-DE" dirty="0" err="1"/>
+              <a:t>of</a:t>
+            </a:r>
+            <a:r>
+              <a:rPr lang="de-DE" altLang="en-DE" dirty="0"/>
+              <a:t> Tübingen</a:t>
+            </a:r>
+          </a:p>
+        </p:txBody>
+      </p:sp>
+      <p:sp>
+        <p:nvSpPr>
+          <p:cNvPr id="7" name="TextBox 6">
+            <a:extLst>
+              <a:ext uri="{FF2B5EF4-FFF2-40B4-BE49-F238E27FC236}">
+                <a16:creationId xmlns:a16="http://schemas.microsoft.com/office/drawing/2014/main" id="{CE02424B-1B44-964D-A1D8-6EDD247DFD22}"/>
+              </a:ext>
+            </a:extLst>
+          </p:cNvPr>
+          <p:cNvSpPr txBox="1"/>
+          <p:nvPr/>
+        </p:nvSpPr>
+        <p:spPr>
+          <a:xfrm>
+            <a:off x="719138" y="982621"/>
+            <a:ext cx="8212989" cy="1015663"/>
+          </a:xfrm>
+          <a:prstGeom prst="rect">
+            <a:avLst/>
+          </a:prstGeom>
+          <a:noFill/>
+        </p:spPr>
+        <p:txBody>
+          <a:bodyPr wrap="square" rtlCol="0">
+            <a:spAutoFit/>
+          </a:bodyPr>
+          <a:lstStyle/>
+          <a:p>
+            <a:r>
+              <a:rPr lang="en-GB" sz="6000" dirty="0">
+                <a:solidFill>
+                  <a:schemeClr val="tx1">
+                    <a:lumMod val="50000"/>
+                    <a:lumOff val="50000"/>
+                  </a:schemeClr>
+                </a:solidFill>
+                <a:latin typeface="Berlin Sans FB" panose="020F0502020204030204" pitchFamily="34" charset="0"/>
+                <a:cs typeface="Berlin Sans FB" panose="020F0502020204030204" pitchFamily="34" charset="0"/>
+              </a:rPr>
+              <a:t>Project:</a:t>
+            </a:r>
+          </a:p>
+        </p:txBody>
+      </p:sp>
+      <p:sp>
+        <p:nvSpPr>
+          <p:cNvPr id="6" name="TextBox 5">
+            <a:extLst>
+              <a:ext uri="{FF2B5EF4-FFF2-40B4-BE49-F238E27FC236}">
+                <a16:creationId xmlns:a16="http://schemas.microsoft.com/office/drawing/2014/main" id="{9A572F02-FCCA-4B62-B0A0-9A5290204C2B}"/>
+              </a:ext>
+            </a:extLst>
+          </p:cNvPr>
+          <p:cNvSpPr txBox="1"/>
+          <p:nvPr/>
+        </p:nvSpPr>
+        <p:spPr>
+          <a:xfrm>
+            <a:off x="838540" y="1998284"/>
+            <a:ext cx="7466920" cy="1077218"/>
+          </a:xfrm>
+          <a:prstGeom prst="rect">
+            <a:avLst/>
+          </a:prstGeom>
+          <a:noFill/>
+        </p:spPr>
+        <p:txBody>
+          <a:bodyPr wrap="square" rtlCol="0">
+            <a:spAutoFit/>
+          </a:bodyPr>
+          <a:lstStyle/>
+          <a:p>
+            <a:pPr marL="285750" indent="-285750">
+              <a:buFont typeface="Arial" panose="020B0604020202020204" pitchFamily="34" charset="0"/>
+              <a:buChar char="•"/>
+            </a:pPr>
+            <a:r>
+              <a:rPr lang="en-US" sz="3200" dirty="0">
+                <a:latin typeface="Berlin Sans FB" panose="020E0602020502020306" pitchFamily="34" charset="0"/>
+              </a:rPr>
+              <a:t>Build a decoy database generator</a:t>
+            </a:r>
+          </a:p>
+          <a:p>
+            <a:pPr marL="285750" indent="-285750">
+              <a:buFont typeface="Arial" panose="020B0604020202020204" pitchFamily="34" charset="0"/>
+              <a:buChar char="•"/>
+            </a:pPr>
+            <a:endParaRPr lang="en-US" sz="3200" dirty="0">
+              <a:solidFill>
+                <a:schemeClr val="tx1">
+                  <a:lumMod val="60000"/>
+                  <a:lumOff val="40000"/>
+                </a:schemeClr>
+              </a:solidFill>
+              <a:latin typeface="Berlin Sans FB" panose="020E0602020502020306" pitchFamily="34" charset="0"/>
+            </a:endParaRPr>
+          </a:p>
+        </p:txBody>
+      </p:sp>
+    </p:spTree>
+    <p:extLst>
+      <p:ext uri="{BB962C8B-B14F-4D97-AF65-F5344CB8AC3E}">
+        <p14:creationId xmlns:p14="http://schemas.microsoft.com/office/powerpoint/2010/main" val="1210839149"/>
+      </p:ext>
+    </p:extLst>
+  </p:cSld>
+  <p:clrMapOvr>
+    <a:masterClrMapping/>
+  </p:clrMapOvr>
+</p:sld>
+</file>
+
+<file path=ppt/slides/slide23.xml><?xml version="1.0" encoding="utf-8"?>
+<p:sld xmlns:a="http://schemas.openxmlformats.org/drawingml/2006/main" xmlns:r="http://schemas.openxmlformats.org/officeDocument/2006/relationships" xmlns:p="http://schemas.openxmlformats.org/presentationml/2006/main">
+  <p:cSld>
+    <p:spTree>
+      <p:nvGrpSpPr>
+        <p:cNvPr id="1" name=""/>
+        <p:cNvGrpSpPr/>
+        <p:nvPr/>
+      </p:nvGrpSpPr>
+      <p:grpSpPr>
+        <a:xfrm>
+          <a:off x="0" y="0"/>
+          <a:ext cx="0" cy="0"/>
+          <a:chOff x="0" y="0"/>
+          <a:chExt cx="0" cy="0"/>
+        </a:xfrm>
+      </p:grpSpPr>
+      <p:sp>
+        <p:nvSpPr>
+          <p:cNvPr id="5" name="Slide Number Placeholder 3">
+            <a:extLst>
+              <a:ext uri="{FF2B5EF4-FFF2-40B4-BE49-F238E27FC236}">
+                <a16:creationId xmlns:a16="http://schemas.microsoft.com/office/drawing/2014/main" id="{88A19A4B-57C6-5140-A43C-B8D8318275FC}"/>
+              </a:ext>
+            </a:extLst>
+          </p:cNvPr>
+          <p:cNvSpPr>
+            <a:spLocks noGrp="1"/>
+          </p:cNvSpPr>
+          <p:nvPr>
+            <p:ph type="sldNum" sz="quarter" idx="10"/>
+          </p:nvPr>
+        </p:nvSpPr>
+        <p:spPr/>
+        <p:txBody>
+          <a:bodyPr/>
+          <a:lstStyle/>
+          <a:p>
+            <a:fld id="{F8D72127-71F4-024A-9532-225DC2F8CFB8}" type="slidenum">
+              <a:rPr lang="de-DE" altLang="en-DE"/>
+              <a:pPr/>
+              <a:t>23</a:t>
             </a:fld>
             <a:r>
               <a:rPr lang="de-DE" altLang="en-DE" dirty="0"/>

</xml_diff>

<commit_message>
Updated slide and reordered where inheritance is introduces
</commit_message>
<xml_diff>
--- a/slides/python_oop_introduction.pptx
+++ b/slides/python_oop_introduction.pptx
@@ -5,10 +5,10 @@
     <p:sldMasterId id="2147483649" r:id="rId1"/>
   </p:sldMasterIdLst>
   <p:notesMasterIdLst>
-    <p:notesMasterId r:id="rId25"/>
+    <p:notesMasterId r:id="rId24"/>
   </p:notesMasterIdLst>
   <p:handoutMasterIdLst>
-    <p:handoutMasterId r:id="rId26"/>
+    <p:handoutMasterId r:id="rId25"/>
   </p:handoutMasterIdLst>
   <p:sldIdLst>
     <p:sldId id="257" r:id="rId2"/>
@@ -27,13 +27,12 @@
     <p:sldId id="359" r:id="rId15"/>
     <p:sldId id="360" r:id="rId16"/>
     <p:sldId id="361" r:id="rId17"/>
-    <p:sldId id="364" r:id="rId18"/>
+    <p:sldId id="362" r:id="rId18"/>
     <p:sldId id="370" r:id="rId19"/>
     <p:sldId id="371" r:id="rId20"/>
-    <p:sldId id="362" r:id="rId21"/>
-    <p:sldId id="367" r:id="rId22"/>
-    <p:sldId id="368" r:id="rId23"/>
-    <p:sldId id="369" r:id="rId24"/>
+    <p:sldId id="367" r:id="rId21"/>
+    <p:sldId id="368" r:id="rId22"/>
+    <p:sldId id="369" r:id="rId23"/>
   </p:sldIdLst>
   <p:sldSz cx="9144000" cy="6858000" type="screen4x3"/>
   <p:notesSz cx="6858000" cy="9144000"/>
@@ -2075,7 +2074,7 @@
     </p:spTree>
     <p:extLst>
       <p:ext uri="{BB962C8B-B14F-4D97-AF65-F5344CB8AC3E}">
-        <p14:creationId xmlns:p14="http://schemas.microsoft.com/office/powerpoint/2010/main" val="3364012733"/>
+        <p14:creationId xmlns:p14="http://schemas.microsoft.com/office/powerpoint/2010/main" val="3845483854"/>
       </p:ext>
     </p:extLst>
   </p:cSld>
@@ -2503,7 +2502,7 @@
     </p:spTree>
     <p:extLst>
       <p:ext uri="{BB962C8B-B14F-4D97-AF65-F5344CB8AC3E}">
-        <p14:creationId xmlns:p14="http://schemas.microsoft.com/office/powerpoint/2010/main" val="3845483854"/>
+        <p14:creationId xmlns:p14="http://schemas.microsoft.com/office/powerpoint/2010/main" val="3300602968"/>
       </p:ext>
     </p:extLst>
   </p:cSld>
@@ -2610,7 +2609,7 @@
     </p:spTree>
     <p:extLst>
       <p:ext uri="{BB962C8B-B14F-4D97-AF65-F5344CB8AC3E}">
-        <p14:creationId xmlns:p14="http://schemas.microsoft.com/office/powerpoint/2010/main" val="3300602968"/>
+        <p14:creationId xmlns:p14="http://schemas.microsoft.com/office/powerpoint/2010/main" val="1401498857"/>
       </p:ext>
     </p:extLst>
   </p:cSld>
@@ -2664,113 +2663,6 @@
               <a:rPr lang="de-DE" altLang="en-DE"/>
               <a:pPr/>
               <a:t>22</a:t>
-            </a:fld>
-            <a:endParaRPr lang="de-DE" altLang="en-DE"/>
-          </a:p>
-        </p:txBody>
-      </p:sp>
-      <p:sp>
-        <p:nvSpPr>
-          <p:cNvPr id="76802" name="Rectangle 2">
-            <a:extLst>
-              <a:ext uri="{FF2B5EF4-FFF2-40B4-BE49-F238E27FC236}">
-                <a16:creationId xmlns:a16="http://schemas.microsoft.com/office/drawing/2014/main" id="{5E90339C-E52D-484F-8976-61C6E64A555B}"/>
-              </a:ext>
-            </a:extLst>
-          </p:cNvPr>
-          <p:cNvSpPr>
-            <a:spLocks noGrp="1" noRot="1" noChangeAspect="1" noChangeArrowheads="1" noTextEdit="1"/>
-          </p:cNvSpPr>
-          <p:nvPr>
-            <p:ph type="sldImg"/>
-          </p:nvPr>
-        </p:nvSpPr>
-        <p:spPr>
-          <a:ln/>
-        </p:spPr>
-      </p:sp>
-      <p:sp>
-        <p:nvSpPr>
-          <p:cNvPr id="76803" name="Rectangle 3">
-            <a:extLst>
-              <a:ext uri="{FF2B5EF4-FFF2-40B4-BE49-F238E27FC236}">
-                <a16:creationId xmlns:a16="http://schemas.microsoft.com/office/drawing/2014/main" id="{7C580580-A363-AD41-9E48-DB3D626BBC86}"/>
-              </a:ext>
-            </a:extLst>
-          </p:cNvPr>
-          <p:cNvSpPr>
-            <a:spLocks noGrp="1" noChangeArrowheads="1"/>
-          </p:cNvSpPr>
-          <p:nvPr>
-            <p:ph type="body" idx="1"/>
-          </p:nvPr>
-        </p:nvSpPr>
-        <p:spPr/>
-        <p:txBody>
-          <a:bodyPr/>
-          <a:lstStyle/>
-          <a:p>
-            <a:endParaRPr lang="en-GB" altLang="en-DE"/>
-          </a:p>
-        </p:txBody>
-      </p:sp>
-    </p:spTree>
-    <p:extLst>
-      <p:ext uri="{BB962C8B-B14F-4D97-AF65-F5344CB8AC3E}">
-        <p14:creationId xmlns:p14="http://schemas.microsoft.com/office/powerpoint/2010/main" val="1401498857"/>
-      </p:ext>
-    </p:extLst>
-  </p:cSld>
-  <p:clrMapOvr>
-    <a:masterClrMapping/>
-  </p:clrMapOvr>
-</p:notes>
-</file>
-
-<file path=ppt/notesSlides/notesSlide23.xml><?xml version="1.0" encoding="utf-8"?>
-<p:notes xmlns:a="http://schemas.openxmlformats.org/drawingml/2006/main" xmlns:r="http://schemas.openxmlformats.org/officeDocument/2006/relationships" xmlns:p="http://schemas.openxmlformats.org/presentationml/2006/main">
-  <p:cSld>
-    <p:spTree>
-      <p:nvGrpSpPr>
-        <p:cNvPr id="1" name=""/>
-        <p:cNvGrpSpPr/>
-        <p:nvPr/>
-      </p:nvGrpSpPr>
-      <p:grpSpPr>
-        <a:xfrm>
-          <a:off x="0" y="0"/>
-          <a:ext cx="0" cy="0"/>
-          <a:chOff x="0" y="0"/>
-          <a:chExt cx="0" cy="0"/>
-        </a:xfrm>
-      </p:grpSpPr>
-      <p:sp>
-        <p:nvSpPr>
-          <p:cNvPr id="7" name="Rectangle 7">
-            <a:extLst>
-              <a:ext uri="{FF2B5EF4-FFF2-40B4-BE49-F238E27FC236}">
-                <a16:creationId xmlns:a16="http://schemas.microsoft.com/office/drawing/2014/main" id="{1186215F-B194-9D4C-8715-1DBDABD2D273}"/>
-              </a:ext>
-            </a:extLst>
-          </p:cNvPr>
-          <p:cNvSpPr>
-            <a:spLocks noGrp="1" noChangeArrowheads="1"/>
-          </p:cNvSpPr>
-          <p:nvPr>
-            <p:ph type="sldNum" sz="quarter" idx="5"/>
-          </p:nvPr>
-        </p:nvSpPr>
-        <p:spPr>
-          <a:ln/>
-        </p:spPr>
-        <p:txBody>
-          <a:bodyPr/>
-          <a:lstStyle/>
-          <a:p>
-            <a:fld id="{4F1300AB-B724-4D44-8C71-343ACB7ED486}" type="slidenum">
-              <a:rPr lang="de-DE" altLang="en-DE"/>
-              <a:pPr/>
-              <a:t>23</a:t>
             </a:fld>
             <a:endParaRPr lang="de-DE" altLang="en-DE"/>
           </a:p>
@@ -8690,7 +8582,7 @@
                 <a:latin typeface="Berlin Sans FB" panose="020F0502020204030204" pitchFamily="34" charset="0"/>
                 <a:cs typeface="Berlin Sans FB" panose="020F0502020204030204" pitchFamily="34" charset="0"/>
               </a:rPr>
-              <a:t>What are</a:t>
+              <a:t>What is</a:t>
             </a:r>
           </a:p>
           <a:p>
@@ -8705,17 +8597,17 @@
                 <a:latin typeface="Berlin Sans FB" panose="020F0502020204030204" pitchFamily="34" charset="0"/>
                 <a:cs typeface="Berlin Sans FB" panose="020F0502020204030204" pitchFamily="34" charset="0"/>
               </a:rPr>
-              <a:t>Methods?</a:t>
+              <a:t>Inheritance?</a:t>
             </a:r>
           </a:p>
         </p:txBody>
       </p:sp>
       <p:pic>
         <p:nvPicPr>
-          <p:cNvPr id="6" name="Picture 5" descr="Graphical user interface, text, application&#10;&#10;Description automatically generated">
-            <a:extLst>
-              <a:ext uri="{FF2B5EF4-FFF2-40B4-BE49-F238E27FC236}">
-                <a16:creationId xmlns:a16="http://schemas.microsoft.com/office/drawing/2014/main" id="{5A5357BE-7D34-9046-A7F5-E22A648B138A}"/>
+          <p:cNvPr id="4" name="Picture 3" descr="A picture containing text&#10;&#10;Description automatically generated">
+            <a:extLst>
+              <a:ext uri="{FF2B5EF4-FFF2-40B4-BE49-F238E27FC236}">
+                <a16:creationId xmlns:a16="http://schemas.microsoft.com/office/drawing/2014/main" id="{F3A8B835-887A-4D2C-A1FB-BF7C9607E668}"/>
               </a:ext>
             </a:extLst>
           </p:cNvPr>
@@ -8732,8 +8624,8 @@
         </p:blipFill>
         <p:spPr>
           <a:xfrm>
-            <a:off x="1986979" y="2762506"/>
-            <a:ext cx="5170042" cy="3209537"/>
+            <a:off x="2199944" y="2798659"/>
+            <a:ext cx="4744112" cy="2791215"/>
           </a:xfrm>
           <a:prstGeom prst="rect">
             <a:avLst/>
@@ -8743,7 +8635,7 @@
     </p:spTree>
     <p:extLst>
       <p:ext uri="{BB962C8B-B14F-4D97-AF65-F5344CB8AC3E}">
-        <p14:creationId xmlns:p14="http://schemas.microsoft.com/office/powerpoint/2010/main" val="1671684466"/>
+        <p14:creationId xmlns:p14="http://schemas.microsoft.com/office/powerpoint/2010/main" val="2571570597"/>
       </p:ext>
     </p:extLst>
   </p:cSld>
@@ -9510,7 +9402,7 @@
         <p:spPr>
           <a:xfrm>
             <a:off x="719138" y="982621"/>
-            <a:ext cx="8212989" cy="1508105"/>
+            <a:ext cx="8212989" cy="1015663"/>
           </a:xfrm>
           <a:prstGeom prst="rect">
             <a:avLst/>
@@ -9524,20 +9416,6 @@
           <a:lstStyle/>
           <a:p>
             <a:r>
-              <a:rPr lang="en-GB" sz="3200" dirty="0">
-                <a:solidFill>
-                  <a:schemeClr val="bg1">
-                    <a:lumMod val="75000"/>
-                  </a:schemeClr>
-                </a:solidFill>
-                <a:latin typeface="Berlin Sans FB" panose="020F0502020204030204" pitchFamily="34" charset="0"/>
-                <a:cs typeface="Berlin Sans FB" panose="020F0502020204030204" pitchFamily="34" charset="0"/>
-              </a:rPr>
-              <a:t>What is</a:t>
-            </a:r>
-          </a:p>
-          <a:p>
-            <a:r>
               <a:rPr lang="en-GB" sz="6000" dirty="0">
                 <a:solidFill>
                   <a:schemeClr val="tx1">
@@ -9548,45 +9426,15 @@
                 <a:latin typeface="Berlin Sans FB" panose="020F0502020204030204" pitchFamily="34" charset="0"/>
                 <a:cs typeface="Berlin Sans FB" panose="020F0502020204030204" pitchFamily="34" charset="0"/>
               </a:rPr>
-              <a:t>Inheritance?</a:t>
-            </a:r>
-          </a:p>
-        </p:txBody>
-      </p:sp>
-      <p:pic>
-        <p:nvPicPr>
-          <p:cNvPr id="4" name="Picture 3" descr="A picture containing text&#10;&#10;Description automatically generated">
-            <a:extLst>
-              <a:ext uri="{FF2B5EF4-FFF2-40B4-BE49-F238E27FC236}">
-                <a16:creationId xmlns:a16="http://schemas.microsoft.com/office/drawing/2014/main" id="{F3A8B835-887A-4D2C-A1FB-BF7C9607E668}"/>
-              </a:ext>
-            </a:extLst>
-          </p:cNvPr>
-          <p:cNvPicPr>
-            <a:picLocks noChangeAspect="1"/>
-          </p:cNvPicPr>
-          <p:nvPr/>
-        </p:nvPicPr>
-        <p:blipFill>
-          <a:blip r:embed="rId3"/>
-          <a:stretch>
-            <a:fillRect/>
-          </a:stretch>
-        </p:blipFill>
-        <p:spPr>
-          <a:xfrm>
-            <a:off x="2199944" y="2798659"/>
-            <a:ext cx="4744112" cy="2791215"/>
-          </a:xfrm>
-          <a:prstGeom prst="rect">
-            <a:avLst/>
-          </a:prstGeom>
-        </p:spPr>
-      </p:pic>
+              <a:t>Questions?</a:t>
+            </a:r>
+          </a:p>
+        </p:txBody>
+      </p:sp>
     </p:spTree>
     <p:extLst>
       <p:ext uri="{BB962C8B-B14F-4D97-AF65-F5344CB8AC3E}">
-        <p14:creationId xmlns:p14="http://schemas.microsoft.com/office/powerpoint/2010/main" val="2571570597"/>
+        <p14:creationId xmlns:p14="http://schemas.microsoft.com/office/powerpoint/2010/main" val="2390257302"/>
       </p:ext>
     </p:extLst>
   </p:cSld>
@@ -9701,15 +9549,71 @@
                 <a:latin typeface="Berlin Sans FB" panose="020F0502020204030204" pitchFamily="34" charset="0"/>
                 <a:cs typeface="Berlin Sans FB" panose="020F0502020204030204" pitchFamily="34" charset="0"/>
               </a:rPr>
-              <a:t>Questions?</a:t>
-            </a:r>
+              <a:t>Project:</a:t>
+            </a:r>
+          </a:p>
+        </p:txBody>
+      </p:sp>
+      <p:sp>
+        <p:nvSpPr>
+          <p:cNvPr id="6" name="TextBox 5">
+            <a:extLst>
+              <a:ext uri="{FF2B5EF4-FFF2-40B4-BE49-F238E27FC236}">
+                <a16:creationId xmlns:a16="http://schemas.microsoft.com/office/drawing/2014/main" id="{9A572F02-FCCA-4B62-B0A0-9A5290204C2B}"/>
+              </a:ext>
+            </a:extLst>
+          </p:cNvPr>
+          <p:cNvSpPr txBox="1"/>
+          <p:nvPr/>
+        </p:nvSpPr>
+        <p:spPr>
+          <a:xfrm>
+            <a:off x="838540" y="1998284"/>
+            <a:ext cx="7466920" cy="1077218"/>
+          </a:xfrm>
+          <a:prstGeom prst="rect">
+            <a:avLst/>
+          </a:prstGeom>
+          <a:noFill/>
+        </p:spPr>
+        <p:txBody>
+          <a:bodyPr wrap="square" rtlCol="0">
+            <a:spAutoFit/>
+          </a:bodyPr>
+          <a:lstStyle/>
+          <a:p>
+            <a:pPr marL="285750" indent="-285750">
+              <a:buFont typeface="Arial" panose="020B0604020202020204" pitchFamily="34" charset="0"/>
+              <a:buChar char="•"/>
+            </a:pPr>
+            <a:r>
+              <a:rPr lang="en-US" sz="3200" dirty="0">
+                <a:latin typeface="Berlin Sans FB" panose="020E0602020502020306" pitchFamily="34" charset="0"/>
+              </a:rPr>
+              <a:t>Build a decoy database generator</a:t>
+            </a:r>
+          </a:p>
+          <a:p>
+            <a:pPr marL="285750" indent="-285750">
+              <a:buFont typeface="Arial" panose="020B0604020202020204" pitchFamily="34" charset="0"/>
+              <a:buChar char="•"/>
+            </a:pPr>
+            <a:endParaRPr lang="en-US" sz="3200" dirty="0">
+              <a:solidFill>
+                <a:schemeClr val="tx1">
+                  <a:lumMod val="60000"/>
+                  <a:lumOff val="40000"/>
+                </a:schemeClr>
+              </a:solidFill>
+              <a:latin typeface="Berlin Sans FB" panose="020E0602020502020306" pitchFamily="34" charset="0"/>
+            </a:endParaRPr>
           </a:p>
         </p:txBody>
       </p:sp>
     </p:spTree>
     <p:extLst>
       <p:ext uri="{BB962C8B-B14F-4D97-AF65-F5344CB8AC3E}">
-        <p14:creationId xmlns:p14="http://schemas.microsoft.com/office/powerpoint/2010/main" val="2390257302"/>
+        <p14:creationId xmlns:p14="http://schemas.microsoft.com/office/powerpoint/2010/main" val="1210839149"/>
       </p:ext>
     </p:extLst>
   </p:cSld>
@@ -9761,185 +9665,6 @@
               <a:rPr lang="de-DE" altLang="en-DE"/>
               <a:pPr/>
               <a:t>22</a:t>
-            </a:fld>
-            <a:r>
-              <a:rPr lang="de-DE" altLang="en-DE" dirty="0"/>
-              <a:t> | Samuel Wein	© </a:t>
-            </a:r>
-            <a:r>
-              <a:rPr lang="en-GB" altLang="en-DE" dirty="0"/>
-              <a:t>26/10/2020 </a:t>
-            </a:r>
-            <a:r>
-              <a:rPr lang="de-DE" altLang="en-DE" dirty="0"/>
-              <a:t>University </a:t>
-            </a:r>
-            <a:r>
-              <a:rPr lang="de-DE" altLang="en-DE" dirty="0" err="1"/>
-              <a:t>of</a:t>
-            </a:r>
-            <a:r>
-              <a:rPr lang="de-DE" altLang="en-DE" dirty="0"/>
-              <a:t> Tübingen</a:t>
-            </a:r>
-          </a:p>
-        </p:txBody>
-      </p:sp>
-      <p:sp>
-        <p:nvSpPr>
-          <p:cNvPr id="7" name="TextBox 6">
-            <a:extLst>
-              <a:ext uri="{FF2B5EF4-FFF2-40B4-BE49-F238E27FC236}">
-                <a16:creationId xmlns:a16="http://schemas.microsoft.com/office/drawing/2014/main" id="{CE02424B-1B44-964D-A1D8-6EDD247DFD22}"/>
-              </a:ext>
-            </a:extLst>
-          </p:cNvPr>
-          <p:cNvSpPr txBox="1"/>
-          <p:nvPr/>
-        </p:nvSpPr>
-        <p:spPr>
-          <a:xfrm>
-            <a:off x="719138" y="982621"/>
-            <a:ext cx="8212989" cy="1015663"/>
-          </a:xfrm>
-          <a:prstGeom prst="rect">
-            <a:avLst/>
-          </a:prstGeom>
-          <a:noFill/>
-        </p:spPr>
-        <p:txBody>
-          <a:bodyPr wrap="square" rtlCol="0">
-            <a:spAutoFit/>
-          </a:bodyPr>
-          <a:lstStyle/>
-          <a:p>
-            <a:r>
-              <a:rPr lang="en-GB" sz="6000" dirty="0">
-                <a:solidFill>
-                  <a:schemeClr val="tx1">
-                    <a:lumMod val="50000"/>
-                    <a:lumOff val="50000"/>
-                  </a:schemeClr>
-                </a:solidFill>
-                <a:latin typeface="Berlin Sans FB" panose="020F0502020204030204" pitchFamily="34" charset="0"/>
-                <a:cs typeface="Berlin Sans FB" panose="020F0502020204030204" pitchFamily="34" charset="0"/>
-              </a:rPr>
-              <a:t>Project:</a:t>
-            </a:r>
-          </a:p>
-        </p:txBody>
-      </p:sp>
-      <p:sp>
-        <p:nvSpPr>
-          <p:cNvPr id="6" name="TextBox 5">
-            <a:extLst>
-              <a:ext uri="{FF2B5EF4-FFF2-40B4-BE49-F238E27FC236}">
-                <a16:creationId xmlns:a16="http://schemas.microsoft.com/office/drawing/2014/main" id="{9A572F02-FCCA-4B62-B0A0-9A5290204C2B}"/>
-              </a:ext>
-            </a:extLst>
-          </p:cNvPr>
-          <p:cNvSpPr txBox="1"/>
-          <p:nvPr/>
-        </p:nvSpPr>
-        <p:spPr>
-          <a:xfrm>
-            <a:off x="838540" y="1998284"/>
-            <a:ext cx="7466920" cy="1077218"/>
-          </a:xfrm>
-          <a:prstGeom prst="rect">
-            <a:avLst/>
-          </a:prstGeom>
-          <a:noFill/>
-        </p:spPr>
-        <p:txBody>
-          <a:bodyPr wrap="square" rtlCol="0">
-            <a:spAutoFit/>
-          </a:bodyPr>
-          <a:lstStyle/>
-          <a:p>
-            <a:pPr marL="285750" indent="-285750">
-              <a:buFont typeface="Arial" panose="020B0604020202020204" pitchFamily="34" charset="0"/>
-              <a:buChar char="•"/>
-            </a:pPr>
-            <a:r>
-              <a:rPr lang="en-US" sz="3200" dirty="0">
-                <a:latin typeface="Berlin Sans FB" panose="020E0602020502020306" pitchFamily="34" charset="0"/>
-              </a:rPr>
-              <a:t>Build a decoy database generator</a:t>
-            </a:r>
-          </a:p>
-          <a:p>
-            <a:pPr marL="285750" indent="-285750">
-              <a:buFont typeface="Arial" panose="020B0604020202020204" pitchFamily="34" charset="0"/>
-              <a:buChar char="•"/>
-            </a:pPr>
-            <a:endParaRPr lang="en-US" sz="3200" dirty="0">
-              <a:solidFill>
-                <a:schemeClr val="tx1">
-                  <a:lumMod val="60000"/>
-                  <a:lumOff val="40000"/>
-                </a:schemeClr>
-              </a:solidFill>
-              <a:latin typeface="Berlin Sans FB" panose="020E0602020502020306" pitchFamily="34" charset="0"/>
-            </a:endParaRPr>
-          </a:p>
-        </p:txBody>
-      </p:sp>
-    </p:spTree>
-    <p:extLst>
-      <p:ext uri="{BB962C8B-B14F-4D97-AF65-F5344CB8AC3E}">
-        <p14:creationId xmlns:p14="http://schemas.microsoft.com/office/powerpoint/2010/main" val="1210839149"/>
-      </p:ext>
-    </p:extLst>
-  </p:cSld>
-  <p:clrMapOvr>
-    <a:masterClrMapping/>
-  </p:clrMapOvr>
-</p:sld>
-</file>
-
-<file path=ppt/slides/slide23.xml><?xml version="1.0" encoding="utf-8"?>
-<p:sld xmlns:a="http://schemas.openxmlformats.org/drawingml/2006/main" xmlns:r="http://schemas.openxmlformats.org/officeDocument/2006/relationships" xmlns:p="http://schemas.openxmlformats.org/presentationml/2006/main">
-  <p:cSld>
-    <p:spTree>
-      <p:nvGrpSpPr>
-        <p:cNvPr id="1" name=""/>
-        <p:cNvGrpSpPr/>
-        <p:nvPr/>
-      </p:nvGrpSpPr>
-      <p:grpSpPr>
-        <a:xfrm>
-          <a:off x="0" y="0"/>
-          <a:ext cx="0" cy="0"/>
-          <a:chOff x="0" y="0"/>
-          <a:chExt cx="0" cy="0"/>
-        </a:xfrm>
-      </p:grpSpPr>
-      <p:sp>
-        <p:nvSpPr>
-          <p:cNvPr id="5" name="Slide Number Placeholder 3">
-            <a:extLst>
-              <a:ext uri="{FF2B5EF4-FFF2-40B4-BE49-F238E27FC236}">
-                <a16:creationId xmlns:a16="http://schemas.microsoft.com/office/drawing/2014/main" id="{88A19A4B-57C6-5140-A43C-B8D8318275FC}"/>
-              </a:ext>
-            </a:extLst>
-          </p:cNvPr>
-          <p:cNvSpPr>
-            <a:spLocks noGrp="1"/>
-          </p:cNvSpPr>
-          <p:nvPr>
-            <p:ph type="sldNum" sz="quarter" idx="10"/>
-          </p:nvPr>
-        </p:nvSpPr>
-        <p:spPr/>
-        <p:txBody>
-          <a:bodyPr/>
-          <a:lstStyle/>
-          <a:p>
-            <a:fld id="{F8D72127-71F4-024A-9532-225DC2F8CFB8}" type="slidenum">
-              <a:rPr lang="de-DE" altLang="en-DE"/>
-              <a:pPr/>
-              <a:t>23</a:t>
             </a:fld>
             <a:r>
               <a:rPr lang="de-DE" altLang="en-DE" dirty="0"/>

</xml_diff>